<commit_message>
Remove temporary PowerPoint file
</commit_message>
<xml_diff>
--- a/docs/source/core_tools/figures/framed_core_tool_logos.pptx
+++ b/docs/source/core_tools/figures/framed_core_tool_logos.pptx
@@ -7,14 +7,15 @@
   <p:sldIdLst>
     <p:sldId id="256" r:id="rId2"/>
     <p:sldId id="257" r:id="rId3"/>
-    <p:sldId id="258" r:id="rId4"/>
+    <p:sldId id="260" r:id="rId4"/>
     <p:sldId id="259" r:id="rId5"/>
-    <p:sldId id="260" r:id="rId6"/>
-    <p:sldId id="261" r:id="rId7"/>
-    <p:sldId id="262" r:id="rId8"/>
-    <p:sldId id="263" r:id="rId9"/>
-    <p:sldId id="265" r:id="rId10"/>
-    <p:sldId id="266" r:id="rId11"/>
+    <p:sldId id="261" r:id="rId6"/>
+    <p:sldId id="262" r:id="rId7"/>
+    <p:sldId id="263" r:id="rId8"/>
+    <p:sldId id="265" r:id="rId9"/>
+    <p:sldId id="266" r:id="rId10"/>
+    <p:sldId id="267" r:id="rId11"/>
+    <p:sldId id="258" r:id="rId12"/>
   </p:sldIdLst>
   <p:sldSz cx="12192000" cy="6858000"/>
   <p:notesSz cx="6858000" cy="9144000"/>
@@ -3537,10 +3538,10 @@
       </p:sp>
       <p:sp>
         <p:nvSpPr>
-          <p:cNvPr id="7" name="TextBox 6">
+          <p:cNvPr id="5" name="TextBox 4">
             <a:extLst>
               <a:ext uri="{FF2B5EF4-FFF2-40B4-BE49-F238E27FC236}">
-                <a16:creationId xmlns:a16="http://schemas.microsoft.com/office/drawing/2014/main" id="{27ACDD81-4A7F-3C45-8656-2D257E6E3D0B}"/>
+                <a16:creationId xmlns:a16="http://schemas.microsoft.com/office/drawing/2014/main" id="{02CE833A-C6A7-6E4C-9BA2-32B2D0846AF9}"/>
               </a:ext>
             </a:extLst>
           </p:cNvPr>
@@ -3549,7 +3550,7 @@
         </p:nvSpPr>
         <p:spPr>
           <a:xfrm>
-            <a:off x="4267200" y="3803337"/>
+            <a:off x="4267200" y="3923651"/>
             <a:ext cx="3657601" cy="1182022"/>
           </a:xfrm>
           <a:prstGeom prst="rect">
@@ -3573,45 +3574,246 @@
                 <a:ea typeface="Brush Script MT" panose="03060802040406070304" pitchFamily="66" charset="-122"/>
                 <a:cs typeface="Arial" panose="020B0604020202020204" pitchFamily="34" charset="0"/>
               </a:rPr>
-              <a:t>NWB Format Specification</a:t>
+              <a:t>HDMF Common Schema</a:t>
             </a:r>
+          </a:p>
+        </p:txBody>
+      </p:sp>
+      <p:grpSp>
+        <p:nvGrpSpPr>
+          <p:cNvPr id="2" name="Group 1">
+            <a:extLst>
+              <a:ext uri="{FF2B5EF4-FFF2-40B4-BE49-F238E27FC236}">
+                <a16:creationId xmlns:a16="http://schemas.microsoft.com/office/drawing/2014/main" id="{16F19EE4-C497-D349-9862-A918BA2B0569}"/>
+              </a:ext>
+            </a:extLst>
+          </p:cNvPr>
+          <p:cNvGrpSpPr>
+            <a:grpSpLocks noChangeAspect="1"/>
+          </p:cNvGrpSpPr>
+          <p:nvPr/>
+        </p:nvGrpSpPr>
+        <p:grpSpPr>
+          <a:xfrm>
+            <a:off x="4763916" y="1560072"/>
+            <a:ext cx="2671598" cy="2399675"/>
+            <a:chOff x="1101720" y="661737"/>
+            <a:chExt cx="1942269" cy="1744579"/>
+          </a:xfrm>
+        </p:grpSpPr>
+        <p:pic>
+          <p:nvPicPr>
+            <p:cNvPr id="7" name="Graphic 6" descr="Document outline">
+              <a:extLst>
+                <a:ext uri="{FF2B5EF4-FFF2-40B4-BE49-F238E27FC236}">
+                  <a16:creationId xmlns:a16="http://schemas.microsoft.com/office/drawing/2014/main" id="{BE1EACD3-999C-0847-BA07-34ABC58861B2}"/>
+                </a:ext>
+              </a:extLst>
+            </p:cNvPr>
+            <p:cNvPicPr>
+              <a:picLocks noChangeAspect="1"/>
+            </p:cNvPicPr>
+            <p:nvPr/>
+          </p:nvPicPr>
+          <p:blipFill>
+            <a:blip r:embed="rId2">
+              <a:extLst>
+                <a:ext uri="{96DAC541-7B7A-43D3-8B79-37D633B846F1}">
+                  <asvg:svgBlip xmlns:asvg="http://schemas.microsoft.com/office/drawing/2016/SVG/main" r:embed="rId3"/>
+                </a:ext>
+              </a:extLst>
+            </a:blip>
+            <a:stretch>
+              <a:fillRect/>
+            </a:stretch>
+          </p:blipFill>
+          <p:spPr>
+            <a:xfrm>
+              <a:off x="1101720" y="661737"/>
+              <a:ext cx="1942269" cy="1744579"/>
+            </a:xfrm>
+            <a:prstGeom prst="rect">
+              <a:avLst/>
+            </a:prstGeom>
+          </p:spPr>
+        </p:pic>
+        <p:pic>
+          <p:nvPicPr>
+            <p:cNvPr id="2052" name="Picture 4">
+              <a:extLst>
+                <a:ext uri="{FF2B5EF4-FFF2-40B4-BE49-F238E27FC236}">
+                  <a16:creationId xmlns:a16="http://schemas.microsoft.com/office/drawing/2014/main" id="{17638F33-E4F5-2449-AE6B-E8563D93E584}"/>
+                </a:ext>
+              </a:extLst>
+            </p:cNvPr>
+            <p:cNvPicPr>
+              <a:picLocks noChangeAspect="1" noChangeArrowheads="1"/>
+            </p:cNvPicPr>
+            <p:nvPr/>
+          </p:nvPicPr>
+          <p:blipFill rotWithShape="1">
+            <a:blip r:embed="rId4">
+              <a:extLst>
+                <a:ext uri="{28A0092B-C50C-407E-A947-70E740481C1C}">
+                  <a14:useLocalDpi xmlns:a14="http://schemas.microsoft.com/office/drawing/2010/main" val="0"/>
+                </a:ext>
+              </a:extLst>
+            </a:blip>
+            <a:srcRect l="-1" r="1658" b="17918"/>
+            <a:stretch/>
+          </p:blipFill>
+          <p:spPr bwMode="auto">
+            <a:xfrm>
+              <a:off x="1517765" y="1275349"/>
+              <a:ext cx="1109116" cy="818147"/>
+            </a:xfrm>
+            <a:prstGeom prst="rect">
+              <a:avLst/>
+            </a:prstGeom>
+            <a:solidFill>
+              <a:schemeClr val="bg1"/>
+            </a:solidFill>
+            <a:ln>
+              <a:noFill/>
+            </a:ln>
+          </p:spPr>
+        </p:pic>
+      </p:grpSp>
+    </p:spTree>
+    <p:extLst>
+      <p:ext uri="{BB962C8B-B14F-4D97-AF65-F5344CB8AC3E}">
+        <p14:creationId xmlns:p14="http://schemas.microsoft.com/office/powerpoint/2010/main" val="1368087031"/>
+      </p:ext>
+    </p:extLst>
+  </p:cSld>
+  <p:clrMapOvr>
+    <a:masterClrMapping/>
+  </p:clrMapOvr>
+</p:sld>
+</file>
+
+<file path=ppt/slides/slide11.xml><?xml version="1.0" encoding="utf-8"?>
+<p:sld xmlns:a="http://schemas.openxmlformats.org/drawingml/2006/main" xmlns:r="http://schemas.openxmlformats.org/officeDocument/2006/relationships" xmlns:p="http://schemas.openxmlformats.org/presentationml/2006/main">
+  <p:cSld>
+    <p:spTree>
+      <p:nvGrpSpPr>
+        <p:cNvPr id="1" name=""/>
+        <p:cNvGrpSpPr/>
+        <p:nvPr/>
+      </p:nvGrpSpPr>
+      <p:grpSpPr>
+        <a:xfrm>
+          <a:off x="0" y="0"/>
+          <a:ext cx="0" cy="0"/>
+          <a:chOff x="0" y="0"/>
+          <a:chExt cx="0" cy="0"/>
+        </a:xfrm>
+      </p:grpSpPr>
+      <p:sp>
+        <p:nvSpPr>
+          <p:cNvPr id="4" name="Rounded Rectangle 3">
+            <a:extLst>
+              <a:ext uri="{FF2B5EF4-FFF2-40B4-BE49-F238E27FC236}">
+                <a16:creationId xmlns:a16="http://schemas.microsoft.com/office/drawing/2014/main" id="{B13C41E7-B9ED-9143-B398-30AD0586E601}"/>
+              </a:ext>
+            </a:extLst>
+          </p:cNvPr>
+          <p:cNvSpPr>
+            <a:spLocks noChangeAspect="1"/>
+          </p:cNvSpPr>
+          <p:nvPr/>
+        </p:nvSpPr>
+        <p:spPr>
+          <a:xfrm>
+            <a:off x="4267200" y="1521913"/>
+            <a:ext cx="3657600" cy="3657600"/>
+          </a:xfrm>
+          <a:prstGeom prst="roundRect">
+            <a:avLst/>
+          </a:prstGeom>
+          <a:solidFill>
+            <a:schemeClr val="bg1"/>
+          </a:solidFill>
+          <a:ln w="38100">
+            <a:solidFill>
+              <a:srgbClr val="0F4C7C"/>
+            </a:solidFill>
+          </a:ln>
+        </p:spPr>
+        <p:style>
+          <a:lnRef idx="2">
+            <a:schemeClr val="accent1">
+              <a:shade val="50000"/>
+            </a:schemeClr>
+          </a:lnRef>
+          <a:fillRef idx="1">
+            <a:schemeClr val="accent1"/>
+          </a:fillRef>
+          <a:effectRef idx="0">
+            <a:schemeClr val="accent1"/>
+          </a:effectRef>
+          <a:fontRef idx="minor">
+            <a:schemeClr val="lt1"/>
+          </a:fontRef>
+        </p:style>
+        <p:txBody>
+          <a:bodyPr rtlCol="0" anchor="ctr"/>
+          <a:lstStyle/>
+          <a:p>
+            <a:pPr algn="ctr"/>
+            <a:endParaRPr lang="en-US"/>
           </a:p>
         </p:txBody>
       </p:sp>
       <p:pic>
         <p:nvPicPr>
-          <p:cNvPr id="6" name="Picture 5">
+          <p:cNvPr id="2052" name="Picture 4">
             <a:extLst>
               <a:ext uri="{FF2B5EF4-FFF2-40B4-BE49-F238E27FC236}">
-                <a16:creationId xmlns:a16="http://schemas.microsoft.com/office/drawing/2014/main" id="{86F25733-C13D-214E-A560-D1E25611B662}"/>
+                <a16:creationId xmlns:a16="http://schemas.microsoft.com/office/drawing/2014/main" id="{17638F33-E4F5-2449-AE6B-E8563D93E584}"/>
               </a:ext>
             </a:extLst>
           </p:cNvPr>
           <p:cNvPicPr>
-            <a:picLocks noChangeAspect="1"/>
+            <a:picLocks noChangeAspect="1" noChangeArrowheads="1"/>
           </p:cNvPicPr>
           <p:nvPr/>
         </p:nvPicPr>
-        <p:blipFill>
-          <a:blip r:embed="rId2"/>
-          <a:stretch>
-            <a:fillRect/>
-          </a:stretch>
+        <p:blipFill rotWithShape="1">
+          <a:blip r:embed="rId2">
+            <a:extLst>
+              <a:ext uri="{28A0092B-C50C-407E-A947-70E740481C1C}">
+                <a14:useLocalDpi xmlns:a14="http://schemas.microsoft.com/office/drawing/2010/main" val="0"/>
+              </a:ext>
+            </a:extLst>
+          </a:blip>
+          <a:srcRect b="17918"/>
+          <a:stretch/>
         </p:blipFill>
-        <p:spPr>
+        <p:spPr bwMode="auto">
           <a:xfrm>
-            <a:off x="4863591" y="1684751"/>
-            <a:ext cx="2464818" cy="2054014"/>
+            <a:off x="4294462" y="1942727"/>
+            <a:ext cx="3630338" cy="2633564"/>
           </a:xfrm>
           <a:prstGeom prst="rect">
             <a:avLst/>
           </a:prstGeom>
+          <a:noFill/>
+          <a:extLst>
+            <a:ext uri="{909E8E84-426E-40DD-AFC4-6F175D3DCCD1}">
+              <a14:hiddenFill xmlns:a14="http://schemas.microsoft.com/office/drawing/2010/main">
+                <a:solidFill>
+                  <a:srgbClr val="FFFFFF"/>
+                </a:solidFill>
+              </a14:hiddenFill>
+            </a:ext>
+          </a:extLst>
         </p:spPr>
       </p:pic>
     </p:spTree>
     <p:extLst>
       <p:ext uri="{BB962C8B-B14F-4D97-AF65-F5344CB8AC3E}">
-        <p14:creationId xmlns:p14="http://schemas.microsoft.com/office/powerpoint/2010/main" val="3140764176"/>
+        <p14:creationId xmlns:p14="http://schemas.microsoft.com/office/powerpoint/2010/main" val="79759741"/>
       </p:ext>
     </p:extLst>
   </p:cSld>
@@ -3827,57 +4029,83 @@
           </a:p>
         </p:txBody>
       </p:sp>
-      <p:pic>
-        <p:nvPicPr>
-          <p:cNvPr id="2052" name="Picture 4">
+      <p:sp>
+        <p:nvSpPr>
+          <p:cNvPr id="7" name="TextBox 6">
             <a:extLst>
               <a:ext uri="{FF2B5EF4-FFF2-40B4-BE49-F238E27FC236}">
-                <a16:creationId xmlns:a16="http://schemas.microsoft.com/office/drawing/2014/main" id="{17638F33-E4F5-2449-AE6B-E8563D93E584}"/>
+                <a16:creationId xmlns:a16="http://schemas.microsoft.com/office/drawing/2014/main" id="{27ACDD81-4A7F-3C45-8656-2D257E6E3D0B}"/>
               </a:ext>
             </a:extLst>
           </p:cNvPr>
-          <p:cNvPicPr>
-            <a:picLocks noChangeAspect="1" noChangeArrowheads="1"/>
-          </p:cNvPicPr>
+          <p:cNvSpPr txBox="1"/>
           <p:nvPr/>
-        </p:nvPicPr>
-        <p:blipFill>
-          <a:blip r:embed="rId2">
-            <a:extLst>
-              <a:ext uri="{28A0092B-C50C-407E-A947-70E740481C1C}">
-                <a14:useLocalDpi xmlns:a14="http://schemas.microsoft.com/office/drawing/2010/main" val="0"/>
-              </a:ext>
-            </a:extLst>
-          </a:blip>
-          <a:srcRect/>
-          <a:stretch>
-            <a:fillRect/>
-          </a:stretch>
-        </p:blipFill>
-        <p:spPr bwMode="auto">
+        </p:nvSpPr>
+        <p:spPr>
           <a:xfrm>
-            <a:off x="4366654" y="1822322"/>
-            <a:ext cx="3458691" cy="3056781"/>
+            <a:off x="4267200" y="3863497"/>
+            <a:ext cx="3657601" cy="1182022"/>
           </a:xfrm>
           <a:prstGeom prst="rect">
             <a:avLst/>
           </a:prstGeom>
           <a:noFill/>
-          <a:extLst>
-            <a:ext uri="{909E8E84-426E-40DD-AFC4-6F175D3DCCD1}">
-              <a14:hiddenFill xmlns:a14="http://schemas.microsoft.com/office/drawing/2010/main">
+          <a:effectLst/>
+        </p:spPr>
+        <p:txBody>
+          <a:bodyPr wrap="square" lIns="0" tIns="0" rIns="0" bIns="0" rtlCol="0">
+            <a:noAutofit/>
+          </a:bodyPr>
+          <a:lstStyle/>
+          <a:p>
+            <a:pPr algn="ctr"/>
+            <a:r>
+              <a:rPr lang="en-US" sz="4000" dirty="0">
                 <a:solidFill>
-                  <a:srgbClr val="FFFFFF"/>
+                  <a:srgbClr val="0F4C7D"/>
                 </a:solidFill>
-              </a14:hiddenFill>
-            </a:ext>
-          </a:extLst>
+                <a:ea typeface="Brush Script MT" panose="03060802040406070304" pitchFamily="66" charset="-122"/>
+                <a:cs typeface="Arial" panose="020B0604020202020204" pitchFamily="34" charset="0"/>
+              </a:rPr>
+              <a:t>NWB Conversion Tools</a:t>
+            </a:r>
+          </a:p>
+        </p:txBody>
+      </p:sp>
+      <p:pic>
+        <p:nvPicPr>
+          <p:cNvPr id="6" name="Picture 5">
+            <a:extLst>
+              <a:ext uri="{FF2B5EF4-FFF2-40B4-BE49-F238E27FC236}">
+                <a16:creationId xmlns:a16="http://schemas.microsoft.com/office/drawing/2014/main" id="{86F25733-C13D-214E-A560-D1E25611B662}"/>
+              </a:ext>
+            </a:extLst>
+          </p:cNvPr>
+          <p:cNvPicPr>
+            <a:picLocks noChangeAspect="1"/>
+          </p:cNvPicPr>
+          <p:nvPr/>
+        </p:nvPicPr>
+        <p:blipFill>
+          <a:blip r:embed="rId2"/>
+          <a:stretch>
+            <a:fillRect/>
+          </a:stretch>
+        </p:blipFill>
+        <p:spPr>
+          <a:xfrm>
+            <a:off x="4863591" y="1684751"/>
+            <a:ext cx="2464818" cy="2054014"/>
+          </a:xfrm>
+          <a:prstGeom prst="rect">
+            <a:avLst/>
+          </a:prstGeom>
         </p:spPr>
       </p:pic>
     </p:spTree>
     <p:extLst>
       <p:ext uri="{BB962C8B-B14F-4D97-AF65-F5344CB8AC3E}">
-        <p14:creationId xmlns:p14="http://schemas.microsoft.com/office/powerpoint/2010/main" val="79759741"/>
+        <p14:creationId xmlns:p14="http://schemas.microsoft.com/office/powerpoint/2010/main" val="1150090333"/>
       </p:ext>
     </p:extLst>
   </p:cSld>
@@ -4199,83 +4427,100 @@
           </a:p>
         </p:txBody>
       </p:sp>
-      <p:sp>
-        <p:nvSpPr>
-          <p:cNvPr id="7" name="TextBox 6">
+      <p:pic>
+        <p:nvPicPr>
+          <p:cNvPr id="6146" name="Picture 2">
             <a:extLst>
               <a:ext uri="{FF2B5EF4-FFF2-40B4-BE49-F238E27FC236}">
-                <a16:creationId xmlns:a16="http://schemas.microsoft.com/office/drawing/2014/main" id="{27ACDD81-4A7F-3C45-8656-2D257E6E3D0B}"/>
+                <a16:creationId xmlns:a16="http://schemas.microsoft.com/office/drawing/2014/main" id="{F978E0D1-F0EC-FB48-B872-C1DBE0F69F70}"/>
               </a:ext>
             </a:extLst>
           </p:cNvPr>
-          <p:cNvSpPr txBox="1"/>
+          <p:cNvPicPr>
+            <a:picLocks noChangeAspect="1" noChangeArrowheads="1"/>
+          </p:cNvPicPr>
           <p:nvPr/>
-        </p:nvSpPr>
-        <p:spPr>
+        </p:nvPicPr>
+        <p:blipFill rotWithShape="1">
+          <a:blip r:embed="rId2">
+            <a:extLst>
+              <a:ext uri="{28A0092B-C50C-407E-A947-70E740481C1C}">
+                <a14:useLocalDpi xmlns:a14="http://schemas.microsoft.com/office/drawing/2010/main" val="0"/>
+              </a:ext>
+            </a:extLst>
+          </a:blip>
+          <a:srcRect r="62696"/>
+          <a:stretch/>
+        </p:blipFill>
+        <p:spPr bwMode="auto">
           <a:xfrm>
-            <a:off x="4267200" y="3803337"/>
-            <a:ext cx="3657601" cy="1182022"/>
+            <a:off x="5056339" y="1628383"/>
+            <a:ext cx="2096022" cy="1934391"/>
           </a:xfrm>
           <a:prstGeom prst="rect">
             <a:avLst/>
           </a:prstGeom>
           <a:noFill/>
-          <a:effectLst/>
+          <a:extLst>
+            <a:ext uri="{909E8E84-426E-40DD-AFC4-6F175D3DCCD1}">
+              <a14:hiddenFill xmlns:a14="http://schemas.microsoft.com/office/drawing/2010/main">
+                <a:solidFill>
+                  <a:srgbClr val="FFFFFF"/>
+                </a:solidFill>
+              </a14:hiddenFill>
+            </a:ext>
+          </a:extLst>
         </p:spPr>
-        <p:txBody>
-          <a:bodyPr wrap="square" lIns="0" tIns="0" rIns="0" bIns="0" rtlCol="0">
-            <a:noAutofit/>
-          </a:bodyPr>
-          <a:lstStyle/>
-          <a:p>
-            <a:pPr algn="ctr"/>
-            <a:r>
-              <a:rPr lang="en-US" sz="4000" b="1" dirty="0">
-                <a:solidFill>
-                  <a:srgbClr val="0F4C7D"/>
-                </a:solidFill>
-                <a:ea typeface="Brush Script MT" panose="03060802040406070304" pitchFamily="66" charset="-122"/>
-                <a:cs typeface="Arial" panose="020B0604020202020204" pitchFamily="34" charset="0"/>
-              </a:rPr>
-              <a:t>NWB Conversion Tools</a:t>
-            </a:r>
-          </a:p>
-        </p:txBody>
-      </p:sp>
+      </p:pic>
       <p:pic>
         <p:nvPicPr>
-          <p:cNvPr id="6" name="Picture 5">
+          <p:cNvPr id="5" name="Picture 2">
             <a:extLst>
               <a:ext uri="{FF2B5EF4-FFF2-40B4-BE49-F238E27FC236}">
-                <a16:creationId xmlns:a16="http://schemas.microsoft.com/office/drawing/2014/main" id="{86F25733-C13D-214E-A560-D1E25611B662}"/>
+                <a16:creationId xmlns:a16="http://schemas.microsoft.com/office/drawing/2014/main" id="{74F469C7-2F85-CF4B-A7D7-DF595DC9EE46}"/>
               </a:ext>
             </a:extLst>
           </p:cNvPr>
           <p:cNvPicPr>
-            <a:picLocks noChangeAspect="1"/>
+            <a:picLocks noChangeAspect="1" noChangeArrowheads="1"/>
           </p:cNvPicPr>
           <p:nvPr/>
         </p:nvPicPr>
-        <p:blipFill>
-          <a:blip r:embed="rId2"/>
-          <a:stretch>
-            <a:fillRect/>
-          </a:stretch>
+        <p:blipFill rotWithShape="1">
+          <a:blip r:embed="rId2">
+            <a:extLst>
+              <a:ext uri="{28A0092B-C50C-407E-A947-70E740481C1C}">
+                <a14:useLocalDpi xmlns:a14="http://schemas.microsoft.com/office/drawing/2010/main" val="0"/>
+              </a:ext>
+            </a:extLst>
+          </a:blip>
+          <a:srcRect l="37860" r="3432" b="14635"/>
+          <a:stretch/>
         </p:blipFill>
-        <p:spPr>
+        <p:spPr bwMode="auto">
           <a:xfrm>
-            <a:off x="4863591" y="1684751"/>
-            <a:ext cx="2464818" cy="2054014"/>
+            <a:off x="4434214" y="3367519"/>
+            <a:ext cx="3356976" cy="1680470"/>
           </a:xfrm>
           <a:prstGeom prst="rect">
             <a:avLst/>
           </a:prstGeom>
+          <a:noFill/>
+          <a:extLst>
+            <a:ext uri="{909E8E84-426E-40DD-AFC4-6F175D3DCCD1}">
+              <a14:hiddenFill xmlns:a14="http://schemas.microsoft.com/office/drawing/2010/main">
+                <a:solidFill>
+                  <a:srgbClr val="FFFFFF"/>
+                </a:solidFill>
+              </a14:hiddenFill>
+            </a:ext>
+          </a:extLst>
         </p:spPr>
       </p:pic>
     </p:spTree>
     <p:extLst>
       <p:ext uri="{BB962C8B-B14F-4D97-AF65-F5344CB8AC3E}">
-        <p14:creationId xmlns:p14="http://schemas.microsoft.com/office/powerpoint/2010/main" val="1150090333"/>
+        <p14:creationId xmlns:p14="http://schemas.microsoft.com/office/powerpoint/2010/main" val="1645493829"/>
       </p:ext>
     </p:extLst>
   </p:cSld>
@@ -4358,182 +4603,6 @@
           </a:p>
         </p:txBody>
       </p:sp>
-      <p:pic>
-        <p:nvPicPr>
-          <p:cNvPr id="6146" name="Picture 2">
-            <a:extLst>
-              <a:ext uri="{FF2B5EF4-FFF2-40B4-BE49-F238E27FC236}">
-                <a16:creationId xmlns:a16="http://schemas.microsoft.com/office/drawing/2014/main" id="{F978E0D1-F0EC-FB48-B872-C1DBE0F69F70}"/>
-              </a:ext>
-            </a:extLst>
-          </p:cNvPr>
-          <p:cNvPicPr>
-            <a:picLocks noChangeAspect="1" noChangeArrowheads="1"/>
-          </p:cNvPicPr>
-          <p:nvPr/>
-        </p:nvPicPr>
-        <p:blipFill rotWithShape="1">
-          <a:blip r:embed="rId2">
-            <a:extLst>
-              <a:ext uri="{28A0092B-C50C-407E-A947-70E740481C1C}">
-                <a14:useLocalDpi xmlns:a14="http://schemas.microsoft.com/office/drawing/2010/main" val="0"/>
-              </a:ext>
-            </a:extLst>
-          </a:blip>
-          <a:srcRect r="62696"/>
-          <a:stretch/>
-        </p:blipFill>
-        <p:spPr bwMode="auto">
-          <a:xfrm>
-            <a:off x="5056339" y="1628383"/>
-            <a:ext cx="2096022" cy="1934391"/>
-          </a:xfrm>
-          <a:prstGeom prst="rect">
-            <a:avLst/>
-          </a:prstGeom>
-          <a:noFill/>
-          <a:extLst>
-            <a:ext uri="{909E8E84-426E-40DD-AFC4-6F175D3DCCD1}">
-              <a14:hiddenFill xmlns:a14="http://schemas.microsoft.com/office/drawing/2010/main">
-                <a:solidFill>
-                  <a:srgbClr val="FFFFFF"/>
-                </a:solidFill>
-              </a14:hiddenFill>
-            </a:ext>
-          </a:extLst>
-        </p:spPr>
-      </p:pic>
-      <p:pic>
-        <p:nvPicPr>
-          <p:cNvPr id="5" name="Picture 2">
-            <a:extLst>
-              <a:ext uri="{FF2B5EF4-FFF2-40B4-BE49-F238E27FC236}">
-                <a16:creationId xmlns:a16="http://schemas.microsoft.com/office/drawing/2014/main" id="{74F469C7-2F85-CF4B-A7D7-DF595DC9EE46}"/>
-              </a:ext>
-            </a:extLst>
-          </p:cNvPr>
-          <p:cNvPicPr>
-            <a:picLocks noChangeAspect="1" noChangeArrowheads="1"/>
-          </p:cNvPicPr>
-          <p:nvPr/>
-        </p:nvPicPr>
-        <p:blipFill rotWithShape="1">
-          <a:blip r:embed="rId2">
-            <a:extLst>
-              <a:ext uri="{28A0092B-C50C-407E-A947-70E740481C1C}">
-                <a14:useLocalDpi xmlns:a14="http://schemas.microsoft.com/office/drawing/2010/main" val="0"/>
-              </a:ext>
-            </a:extLst>
-          </a:blip>
-          <a:srcRect l="37860" r="3432" b="14635"/>
-          <a:stretch/>
-        </p:blipFill>
-        <p:spPr bwMode="auto">
-          <a:xfrm>
-            <a:off x="4434214" y="3367519"/>
-            <a:ext cx="3356976" cy="1680470"/>
-          </a:xfrm>
-          <a:prstGeom prst="rect">
-            <a:avLst/>
-          </a:prstGeom>
-          <a:noFill/>
-          <a:extLst>
-            <a:ext uri="{909E8E84-426E-40DD-AFC4-6F175D3DCCD1}">
-              <a14:hiddenFill xmlns:a14="http://schemas.microsoft.com/office/drawing/2010/main">
-                <a:solidFill>
-                  <a:srgbClr val="FFFFFF"/>
-                </a:solidFill>
-              </a14:hiddenFill>
-            </a:ext>
-          </a:extLst>
-        </p:spPr>
-      </p:pic>
-    </p:spTree>
-    <p:extLst>
-      <p:ext uri="{BB962C8B-B14F-4D97-AF65-F5344CB8AC3E}">
-        <p14:creationId xmlns:p14="http://schemas.microsoft.com/office/powerpoint/2010/main" val="1645493829"/>
-      </p:ext>
-    </p:extLst>
-  </p:cSld>
-  <p:clrMapOvr>
-    <a:masterClrMapping/>
-  </p:clrMapOvr>
-</p:sld>
-</file>
-
-<file path=ppt/slides/slide7.xml><?xml version="1.0" encoding="utf-8"?>
-<p:sld xmlns:a="http://schemas.openxmlformats.org/drawingml/2006/main" xmlns:r="http://schemas.openxmlformats.org/officeDocument/2006/relationships" xmlns:p="http://schemas.openxmlformats.org/presentationml/2006/main">
-  <p:cSld>
-    <p:spTree>
-      <p:nvGrpSpPr>
-        <p:cNvPr id="1" name=""/>
-        <p:cNvGrpSpPr/>
-        <p:nvPr/>
-      </p:nvGrpSpPr>
-      <p:grpSpPr>
-        <a:xfrm>
-          <a:off x="0" y="0"/>
-          <a:ext cx="0" cy="0"/>
-          <a:chOff x="0" y="0"/>
-          <a:chExt cx="0" cy="0"/>
-        </a:xfrm>
-      </p:grpSpPr>
-      <p:sp>
-        <p:nvSpPr>
-          <p:cNvPr id="4" name="Rounded Rectangle 3">
-            <a:extLst>
-              <a:ext uri="{FF2B5EF4-FFF2-40B4-BE49-F238E27FC236}">
-                <a16:creationId xmlns:a16="http://schemas.microsoft.com/office/drawing/2014/main" id="{B13C41E7-B9ED-9143-B398-30AD0586E601}"/>
-              </a:ext>
-            </a:extLst>
-          </p:cNvPr>
-          <p:cNvSpPr>
-            <a:spLocks noChangeAspect="1"/>
-          </p:cNvSpPr>
-          <p:nvPr/>
-        </p:nvSpPr>
-        <p:spPr>
-          <a:xfrm>
-            <a:off x="4267200" y="1521913"/>
-            <a:ext cx="3657600" cy="3657600"/>
-          </a:xfrm>
-          <a:prstGeom prst="roundRect">
-            <a:avLst/>
-          </a:prstGeom>
-          <a:solidFill>
-            <a:schemeClr val="bg1"/>
-          </a:solidFill>
-          <a:ln w="38100">
-            <a:solidFill>
-              <a:srgbClr val="0F4C7C"/>
-            </a:solidFill>
-          </a:ln>
-        </p:spPr>
-        <p:style>
-          <a:lnRef idx="2">
-            <a:schemeClr val="accent1">
-              <a:shade val="50000"/>
-            </a:schemeClr>
-          </a:lnRef>
-          <a:fillRef idx="1">
-            <a:schemeClr val="accent1"/>
-          </a:fillRef>
-          <a:effectRef idx="0">
-            <a:schemeClr val="accent1"/>
-          </a:effectRef>
-          <a:fontRef idx="minor">
-            <a:schemeClr val="lt1"/>
-          </a:fontRef>
-        </p:style>
-        <p:txBody>
-          <a:bodyPr rtlCol="0" anchor="ctr"/>
-          <a:lstStyle/>
-          <a:p>
-            <a:pPr algn="ctr"/>
-            <a:endParaRPr lang="en-US"/>
-          </a:p>
-        </p:txBody>
-      </p:sp>
       <p:sp>
         <p:nvSpPr>
           <p:cNvPr id="7" name="TextBox 6">
@@ -4731,7 +4800,7 @@
 </p:sld>
 </file>
 
-<file path=ppt/slides/slide8.xml><?xml version="1.0" encoding="utf-8"?>
+<file path=ppt/slides/slide7.xml><?xml version="1.0" encoding="utf-8"?>
 <p:sld xmlns:a="http://schemas.openxmlformats.org/drawingml/2006/main" xmlns:r="http://schemas.openxmlformats.org/officeDocument/2006/relationships" xmlns:p="http://schemas.openxmlformats.org/presentationml/2006/main">
   <p:cSld>
     <p:spTree>
@@ -9364,7 +9433,7 @@
 </p:sld>
 </file>
 
-<file path=ppt/slides/slide9.xml><?xml version="1.0" encoding="utf-8"?>
+<file path=ppt/slides/slide8.xml><?xml version="1.0" encoding="utf-8"?>
 <p:sld xmlns:a="http://schemas.openxmlformats.org/drawingml/2006/main" xmlns:r="http://schemas.openxmlformats.org/officeDocument/2006/relationships" xmlns:p="http://schemas.openxmlformats.org/presentationml/2006/main">
   <p:cSld>
     <p:spTree>
@@ -9620,6 +9689,165 @@
     <p:extLst>
       <p:ext uri="{BB962C8B-B14F-4D97-AF65-F5344CB8AC3E}">
         <p14:creationId xmlns:p14="http://schemas.microsoft.com/office/powerpoint/2010/main" val="3182358566"/>
+      </p:ext>
+    </p:extLst>
+  </p:cSld>
+  <p:clrMapOvr>
+    <a:masterClrMapping/>
+  </p:clrMapOvr>
+</p:sld>
+</file>
+
+<file path=ppt/slides/slide9.xml><?xml version="1.0" encoding="utf-8"?>
+<p:sld xmlns:a="http://schemas.openxmlformats.org/drawingml/2006/main" xmlns:r="http://schemas.openxmlformats.org/officeDocument/2006/relationships" xmlns:p="http://schemas.openxmlformats.org/presentationml/2006/main">
+  <p:cSld>
+    <p:spTree>
+      <p:nvGrpSpPr>
+        <p:cNvPr id="1" name=""/>
+        <p:cNvGrpSpPr/>
+        <p:nvPr/>
+      </p:nvGrpSpPr>
+      <p:grpSpPr>
+        <a:xfrm>
+          <a:off x="0" y="0"/>
+          <a:ext cx="0" cy="0"/>
+          <a:chOff x="0" y="0"/>
+          <a:chExt cx="0" cy="0"/>
+        </a:xfrm>
+      </p:grpSpPr>
+      <p:sp>
+        <p:nvSpPr>
+          <p:cNvPr id="4" name="Rounded Rectangle 3">
+            <a:extLst>
+              <a:ext uri="{FF2B5EF4-FFF2-40B4-BE49-F238E27FC236}">
+                <a16:creationId xmlns:a16="http://schemas.microsoft.com/office/drawing/2014/main" id="{B13C41E7-B9ED-9143-B398-30AD0586E601}"/>
+              </a:ext>
+            </a:extLst>
+          </p:cNvPr>
+          <p:cNvSpPr>
+            <a:spLocks noChangeAspect="1"/>
+          </p:cNvSpPr>
+          <p:nvPr/>
+        </p:nvSpPr>
+        <p:spPr>
+          <a:xfrm>
+            <a:off x="4267200" y="1521913"/>
+            <a:ext cx="3657600" cy="3657600"/>
+          </a:xfrm>
+          <a:prstGeom prst="roundRect">
+            <a:avLst/>
+          </a:prstGeom>
+          <a:solidFill>
+            <a:schemeClr val="bg1"/>
+          </a:solidFill>
+          <a:ln w="38100">
+            <a:solidFill>
+              <a:srgbClr val="0F4C7C"/>
+            </a:solidFill>
+          </a:ln>
+        </p:spPr>
+        <p:style>
+          <a:lnRef idx="2">
+            <a:schemeClr val="accent1">
+              <a:shade val="50000"/>
+            </a:schemeClr>
+          </a:lnRef>
+          <a:fillRef idx="1">
+            <a:schemeClr val="accent1"/>
+          </a:fillRef>
+          <a:effectRef idx="0">
+            <a:schemeClr val="accent1"/>
+          </a:effectRef>
+          <a:fontRef idx="minor">
+            <a:schemeClr val="lt1"/>
+          </a:fontRef>
+        </p:style>
+        <p:txBody>
+          <a:bodyPr rtlCol="0" anchor="ctr"/>
+          <a:lstStyle/>
+          <a:p>
+            <a:pPr algn="ctr"/>
+            <a:endParaRPr lang="en-US"/>
+          </a:p>
+        </p:txBody>
+      </p:sp>
+      <p:sp>
+        <p:nvSpPr>
+          <p:cNvPr id="7" name="TextBox 6">
+            <a:extLst>
+              <a:ext uri="{FF2B5EF4-FFF2-40B4-BE49-F238E27FC236}">
+                <a16:creationId xmlns:a16="http://schemas.microsoft.com/office/drawing/2014/main" id="{27ACDD81-4A7F-3C45-8656-2D257E6E3D0B}"/>
+              </a:ext>
+            </a:extLst>
+          </p:cNvPr>
+          <p:cNvSpPr txBox="1"/>
+          <p:nvPr/>
+        </p:nvSpPr>
+        <p:spPr>
+          <a:xfrm>
+            <a:off x="4267200" y="3803337"/>
+            <a:ext cx="3657601" cy="1182022"/>
+          </a:xfrm>
+          <a:prstGeom prst="rect">
+            <a:avLst/>
+          </a:prstGeom>
+          <a:noFill/>
+          <a:effectLst/>
+        </p:spPr>
+        <p:txBody>
+          <a:bodyPr wrap="square" lIns="0" tIns="0" rIns="0" bIns="0" rtlCol="0">
+            <a:noAutofit/>
+          </a:bodyPr>
+          <a:lstStyle/>
+          <a:p>
+            <a:pPr algn="ctr"/>
+            <a:r>
+              <a:rPr lang="en-US" sz="4000" dirty="0">
+                <a:solidFill>
+                  <a:srgbClr val="0F4C7D"/>
+                </a:solidFill>
+                <a:ea typeface="Brush Script MT" panose="03060802040406070304" pitchFamily="66" charset="-122"/>
+                <a:cs typeface="Arial" panose="020B0604020202020204" pitchFamily="34" charset="0"/>
+              </a:rPr>
+              <a:t>NWB Format Specification</a:t>
+            </a:r>
+          </a:p>
+        </p:txBody>
+      </p:sp>
+      <p:pic>
+        <p:nvPicPr>
+          <p:cNvPr id="6" name="Picture 5">
+            <a:extLst>
+              <a:ext uri="{FF2B5EF4-FFF2-40B4-BE49-F238E27FC236}">
+                <a16:creationId xmlns:a16="http://schemas.microsoft.com/office/drawing/2014/main" id="{86F25733-C13D-214E-A560-D1E25611B662}"/>
+              </a:ext>
+            </a:extLst>
+          </p:cNvPr>
+          <p:cNvPicPr>
+            <a:picLocks noChangeAspect="1"/>
+          </p:cNvPicPr>
+          <p:nvPr/>
+        </p:nvPicPr>
+        <p:blipFill>
+          <a:blip r:embed="rId2"/>
+          <a:stretch>
+            <a:fillRect/>
+          </a:stretch>
+        </p:blipFill>
+        <p:spPr>
+          <a:xfrm>
+            <a:off x="4863591" y="1684751"/>
+            <a:ext cx="2464818" cy="2054014"/>
+          </a:xfrm>
+          <a:prstGeom prst="rect">
+            <a:avLst/>
+          </a:prstGeom>
+        </p:spPr>
+      </p:pic>
+    </p:spTree>
+    <p:extLst>
+      <p:ext uri="{BB962C8B-B14F-4D97-AF65-F5344CB8AC3E}">
+        <p14:creationId xmlns:p14="http://schemas.microsoft.com/office/powerpoint/2010/main" val="3140764176"/>
       </p:ext>
     </p:extLst>
   </p:cSld>

</xml_diff>

<commit_message>
Update neuroconv logo (#79)
</commit_message>
<xml_diff>
--- a/docs/source/core_tools/figures/framed_core_tool_logos.pptx
+++ b/docs/source/core_tools/figures/framed_core_tool_logos.pptx
@@ -15,7 +15,8 @@
     <p:sldId id="265" r:id="rId9"/>
     <p:sldId id="266" r:id="rId10"/>
     <p:sldId id="267" r:id="rId11"/>
-    <p:sldId id="258" r:id="rId12"/>
+    <p:sldId id="268" r:id="rId12"/>
+    <p:sldId id="258" r:id="rId13"/>
   </p:sldIdLst>
   <p:sldSz cx="12192000" cy="6858000"/>
   <p:notesSz cx="6858000" cy="9144000"/>
@@ -280,7 +281,7 @@
           <a:p>
             <a:fld id="{9777CE0B-FDD2-AE4F-949E-C253776A1713}" type="datetimeFigureOut">
               <a:rPr lang="en-US" smtClean="0"/>
-              <a:t>8/10/22</a:t>
+              <a:t>2/18/23</a:t>
             </a:fld>
             <a:endParaRPr lang="en-US"/>
           </a:p>
@@ -478,7 +479,7 @@
           <a:p>
             <a:fld id="{9777CE0B-FDD2-AE4F-949E-C253776A1713}" type="datetimeFigureOut">
               <a:rPr lang="en-US" smtClean="0"/>
-              <a:t>8/10/22</a:t>
+              <a:t>2/18/23</a:t>
             </a:fld>
             <a:endParaRPr lang="en-US"/>
           </a:p>
@@ -686,7 +687,7 @@
           <a:p>
             <a:fld id="{9777CE0B-FDD2-AE4F-949E-C253776A1713}" type="datetimeFigureOut">
               <a:rPr lang="en-US" smtClean="0"/>
-              <a:t>8/10/22</a:t>
+              <a:t>2/18/23</a:t>
             </a:fld>
             <a:endParaRPr lang="en-US"/>
           </a:p>
@@ -884,7 +885,7 @@
           <a:p>
             <a:fld id="{9777CE0B-FDD2-AE4F-949E-C253776A1713}" type="datetimeFigureOut">
               <a:rPr lang="en-US" smtClean="0"/>
-              <a:t>8/10/22</a:t>
+              <a:t>2/18/23</a:t>
             </a:fld>
             <a:endParaRPr lang="en-US"/>
           </a:p>
@@ -1159,7 +1160,7 @@
           <a:p>
             <a:fld id="{9777CE0B-FDD2-AE4F-949E-C253776A1713}" type="datetimeFigureOut">
               <a:rPr lang="en-US" smtClean="0"/>
-              <a:t>8/10/22</a:t>
+              <a:t>2/18/23</a:t>
             </a:fld>
             <a:endParaRPr lang="en-US"/>
           </a:p>
@@ -1424,7 +1425,7 @@
           <a:p>
             <a:fld id="{9777CE0B-FDD2-AE4F-949E-C253776A1713}" type="datetimeFigureOut">
               <a:rPr lang="en-US" smtClean="0"/>
-              <a:t>8/10/22</a:t>
+              <a:t>2/18/23</a:t>
             </a:fld>
             <a:endParaRPr lang="en-US"/>
           </a:p>
@@ -1836,7 +1837,7 @@
           <a:p>
             <a:fld id="{9777CE0B-FDD2-AE4F-949E-C253776A1713}" type="datetimeFigureOut">
               <a:rPr lang="en-US" smtClean="0"/>
-              <a:t>8/10/22</a:t>
+              <a:t>2/18/23</a:t>
             </a:fld>
             <a:endParaRPr lang="en-US"/>
           </a:p>
@@ -1977,7 +1978,7 @@
           <a:p>
             <a:fld id="{9777CE0B-FDD2-AE4F-949E-C253776A1713}" type="datetimeFigureOut">
               <a:rPr lang="en-US" smtClean="0"/>
-              <a:t>8/10/22</a:t>
+              <a:t>2/18/23</a:t>
             </a:fld>
             <a:endParaRPr lang="en-US"/>
           </a:p>
@@ -2090,7 +2091,7 @@
           <a:p>
             <a:fld id="{9777CE0B-FDD2-AE4F-949E-C253776A1713}" type="datetimeFigureOut">
               <a:rPr lang="en-US" smtClean="0"/>
-              <a:t>8/10/22</a:t>
+              <a:t>2/18/23</a:t>
             </a:fld>
             <a:endParaRPr lang="en-US"/>
           </a:p>
@@ -2401,7 +2402,7 @@
           <a:p>
             <a:fld id="{9777CE0B-FDD2-AE4F-949E-C253776A1713}" type="datetimeFigureOut">
               <a:rPr lang="en-US" smtClean="0"/>
-              <a:t>8/10/22</a:t>
+              <a:t>2/18/23</a:t>
             </a:fld>
             <a:endParaRPr lang="en-US"/>
           </a:p>
@@ -2689,7 +2690,7 @@
           <a:p>
             <a:fld id="{9777CE0B-FDD2-AE4F-949E-C253776A1713}" type="datetimeFigureOut">
               <a:rPr lang="en-US" smtClean="0"/>
-              <a:t>8/10/22</a:t>
+              <a:t>2/18/23</a:t>
             </a:fld>
             <a:endParaRPr lang="en-US"/>
           </a:p>
@@ -2930,7 +2931,7 @@
           <a:p>
             <a:fld id="{9777CE0B-FDD2-AE4F-949E-C253776A1713}" type="datetimeFigureOut">
               <a:rPr lang="en-US" smtClean="0"/>
-              <a:t>8/10/22</a:t>
+              <a:t>2/18/23</a:t>
             </a:fld>
             <a:endParaRPr lang="en-US"/>
           </a:p>
@@ -3765,6 +3766,199 @@
           </a:p>
         </p:txBody>
       </p:sp>
+      <p:sp>
+        <p:nvSpPr>
+          <p:cNvPr id="5" name="TextBox 4">
+            <a:extLst>
+              <a:ext uri="{FF2B5EF4-FFF2-40B4-BE49-F238E27FC236}">
+                <a16:creationId xmlns:a16="http://schemas.microsoft.com/office/drawing/2014/main" id="{02CE833A-C6A7-6E4C-9BA2-32B2D0846AF9}"/>
+              </a:ext>
+            </a:extLst>
+          </p:cNvPr>
+          <p:cNvSpPr txBox="1"/>
+          <p:nvPr/>
+        </p:nvSpPr>
+        <p:spPr>
+          <a:xfrm>
+            <a:off x="4267200" y="4263991"/>
+            <a:ext cx="3657601" cy="841681"/>
+          </a:xfrm>
+          <a:prstGeom prst="rect">
+            <a:avLst/>
+          </a:prstGeom>
+          <a:noFill/>
+          <a:effectLst/>
+        </p:spPr>
+        <p:txBody>
+          <a:bodyPr wrap="square" lIns="0" tIns="0" rIns="0" bIns="0" rtlCol="0">
+            <a:noAutofit/>
+          </a:bodyPr>
+          <a:lstStyle/>
+          <a:p>
+            <a:pPr algn="ctr"/>
+            <a:r>
+              <a:rPr lang="en-US" sz="4000" dirty="0">
+                <a:solidFill>
+                  <a:srgbClr val="0F4C7D"/>
+                </a:solidFill>
+                <a:ea typeface="Brush Script MT" panose="03060802040406070304" pitchFamily="66" charset="-122"/>
+                <a:cs typeface="Arial" panose="020B0604020202020204" pitchFamily="34" charset="0"/>
+              </a:rPr>
+              <a:t>HDMF </a:t>
+            </a:r>
+            <a:r>
+              <a:rPr lang="en-US" sz="4000" dirty="0" err="1">
+                <a:solidFill>
+                  <a:srgbClr val="0F4C7D"/>
+                </a:solidFill>
+                <a:ea typeface="Brush Script MT" panose="03060802040406070304" pitchFamily="66" charset="-122"/>
+                <a:cs typeface="Arial" panose="020B0604020202020204" pitchFamily="34" charset="0"/>
+              </a:rPr>
+              <a:t>Zarr</a:t>
+            </a:r>
+            <a:endParaRPr lang="en-US" sz="4000" dirty="0">
+              <a:solidFill>
+                <a:srgbClr val="0F4C7D"/>
+              </a:solidFill>
+              <a:ea typeface="Brush Script MT" panose="03060802040406070304" pitchFamily="66" charset="-122"/>
+              <a:cs typeface="Arial" panose="020B0604020202020204" pitchFamily="34" charset="0"/>
+            </a:endParaRPr>
+          </a:p>
+        </p:txBody>
+      </p:sp>
+      <p:pic>
+        <p:nvPicPr>
+          <p:cNvPr id="1026" name="Picture 2" descr="Logo">
+            <a:extLst>
+              <a:ext uri="{FF2B5EF4-FFF2-40B4-BE49-F238E27FC236}">
+                <a16:creationId xmlns:a16="http://schemas.microsoft.com/office/drawing/2014/main" id="{CFA1D2AE-4CE3-C835-3C41-11F750A1F20D}"/>
+              </a:ext>
+            </a:extLst>
+          </p:cNvPr>
+          <p:cNvPicPr>
+            <a:picLocks noChangeAspect="1" noChangeArrowheads="1"/>
+          </p:cNvPicPr>
+          <p:nvPr/>
+        </p:nvPicPr>
+        <p:blipFill>
+          <a:blip r:embed="rId2">
+            <a:extLst>
+              <a:ext uri="{28A0092B-C50C-407E-A947-70E740481C1C}">
+                <a14:useLocalDpi xmlns:a14="http://schemas.microsoft.com/office/drawing/2010/main" val="0"/>
+              </a:ext>
+            </a:extLst>
+          </a:blip>
+          <a:srcRect/>
+          <a:stretch>
+            <a:fillRect/>
+          </a:stretch>
+        </p:blipFill>
+        <p:spPr bwMode="auto">
+          <a:xfrm>
+            <a:off x="4460240" y="2077997"/>
+            <a:ext cx="3326598" cy="2041321"/>
+          </a:xfrm>
+          <a:prstGeom prst="rect">
+            <a:avLst/>
+          </a:prstGeom>
+          <a:noFill/>
+          <a:extLst>
+            <a:ext uri="{909E8E84-426E-40DD-AFC4-6F175D3DCCD1}">
+              <a14:hiddenFill xmlns:a14="http://schemas.microsoft.com/office/drawing/2010/main">
+                <a:solidFill>
+                  <a:srgbClr val="FFFFFF"/>
+                </a:solidFill>
+              </a14:hiddenFill>
+            </a:ext>
+          </a:extLst>
+        </p:spPr>
+      </p:pic>
+    </p:spTree>
+    <p:extLst>
+      <p:ext uri="{BB962C8B-B14F-4D97-AF65-F5344CB8AC3E}">
+        <p14:creationId xmlns:p14="http://schemas.microsoft.com/office/powerpoint/2010/main" val="4050295068"/>
+      </p:ext>
+    </p:extLst>
+  </p:cSld>
+  <p:clrMapOvr>
+    <a:masterClrMapping/>
+  </p:clrMapOvr>
+</p:sld>
+</file>
+
+<file path=ppt/slides/slide12.xml><?xml version="1.0" encoding="utf-8"?>
+<p:sld xmlns:a="http://schemas.openxmlformats.org/drawingml/2006/main" xmlns:r="http://schemas.openxmlformats.org/officeDocument/2006/relationships" xmlns:p="http://schemas.openxmlformats.org/presentationml/2006/main">
+  <p:cSld>
+    <p:spTree>
+      <p:nvGrpSpPr>
+        <p:cNvPr id="1" name=""/>
+        <p:cNvGrpSpPr/>
+        <p:nvPr/>
+      </p:nvGrpSpPr>
+      <p:grpSpPr>
+        <a:xfrm>
+          <a:off x="0" y="0"/>
+          <a:ext cx="0" cy="0"/>
+          <a:chOff x="0" y="0"/>
+          <a:chExt cx="0" cy="0"/>
+        </a:xfrm>
+      </p:grpSpPr>
+      <p:sp>
+        <p:nvSpPr>
+          <p:cNvPr id="4" name="Rounded Rectangle 3">
+            <a:extLst>
+              <a:ext uri="{FF2B5EF4-FFF2-40B4-BE49-F238E27FC236}">
+                <a16:creationId xmlns:a16="http://schemas.microsoft.com/office/drawing/2014/main" id="{B13C41E7-B9ED-9143-B398-30AD0586E601}"/>
+              </a:ext>
+            </a:extLst>
+          </p:cNvPr>
+          <p:cNvSpPr>
+            <a:spLocks noChangeAspect="1"/>
+          </p:cNvSpPr>
+          <p:nvPr/>
+        </p:nvSpPr>
+        <p:spPr>
+          <a:xfrm>
+            <a:off x="4267200" y="1521913"/>
+            <a:ext cx="3657600" cy="3657600"/>
+          </a:xfrm>
+          <a:prstGeom prst="roundRect">
+            <a:avLst/>
+          </a:prstGeom>
+          <a:solidFill>
+            <a:schemeClr val="bg1"/>
+          </a:solidFill>
+          <a:ln w="38100">
+            <a:solidFill>
+              <a:srgbClr val="0F4C7C"/>
+            </a:solidFill>
+          </a:ln>
+        </p:spPr>
+        <p:style>
+          <a:lnRef idx="2">
+            <a:schemeClr val="accent1">
+              <a:shade val="50000"/>
+            </a:schemeClr>
+          </a:lnRef>
+          <a:fillRef idx="1">
+            <a:schemeClr val="accent1"/>
+          </a:fillRef>
+          <a:effectRef idx="0">
+            <a:schemeClr val="accent1"/>
+          </a:effectRef>
+          <a:fontRef idx="minor">
+            <a:schemeClr val="lt1"/>
+          </a:fontRef>
+        </p:style>
+        <p:txBody>
+          <a:bodyPr rtlCol="0" anchor="ctr"/>
+          <a:lstStyle/>
+          <a:p>
+            <a:pPr algn="ctr"/>
+            <a:endParaRPr lang="en-US"/>
+          </a:p>
+        </p:txBody>
+      </p:sp>
       <p:pic>
         <p:nvPicPr>
           <p:cNvPr id="2052" name="Picture 4">
@@ -4029,55 +4223,12 @@
           </a:p>
         </p:txBody>
       </p:sp>
-      <p:sp>
-        <p:nvSpPr>
-          <p:cNvPr id="7" name="TextBox 6">
-            <a:extLst>
-              <a:ext uri="{FF2B5EF4-FFF2-40B4-BE49-F238E27FC236}">
-                <a16:creationId xmlns:a16="http://schemas.microsoft.com/office/drawing/2014/main" id="{27ACDD81-4A7F-3C45-8656-2D257E6E3D0B}"/>
-              </a:ext>
-            </a:extLst>
-          </p:cNvPr>
-          <p:cNvSpPr txBox="1"/>
-          <p:nvPr/>
-        </p:nvSpPr>
-        <p:spPr>
-          <a:xfrm>
-            <a:off x="4267200" y="3863497"/>
-            <a:ext cx="3657601" cy="1182022"/>
-          </a:xfrm>
-          <a:prstGeom prst="rect">
-            <a:avLst/>
-          </a:prstGeom>
-          <a:noFill/>
-          <a:effectLst/>
-        </p:spPr>
-        <p:txBody>
-          <a:bodyPr wrap="square" lIns="0" tIns="0" rIns="0" bIns="0" rtlCol="0">
-            <a:noAutofit/>
-          </a:bodyPr>
-          <a:lstStyle/>
-          <a:p>
-            <a:pPr algn="ctr"/>
-            <a:r>
-              <a:rPr lang="en-US" sz="4000" dirty="0">
-                <a:solidFill>
-                  <a:srgbClr val="0F4C7D"/>
-                </a:solidFill>
-                <a:ea typeface="Brush Script MT" panose="03060802040406070304" pitchFamily="66" charset="-122"/>
-                <a:cs typeface="Arial" panose="020B0604020202020204" pitchFamily="34" charset="0"/>
-              </a:rPr>
-              <a:t>NWB Conversion Tools</a:t>
-            </a:r>
-          </a:p>
-        </p:txBody>
-      </p:sp>
       <p:pic>
         <p:nvPicPr>
-          <p:cNvPr id="6" name="Picture 5">
+          <p:cNvPr id="3" name="Picture 2" descr="A picture containing icon&#10;&#10;Description automatically generated">
             <a:extLst>
               <a:ext uri="{FF2B5EF4-FFF2-40B4-BE49-F238E27FC236}">
-                <a16:creationId xmlns:a16="http://schemas.microsoft.com/office/drawing/2014/main" id="{86F25733-C13D-214E-A560-D1E25611B662}"/>
+                <a16:creationId xmlns:a16="http://schemas.microsoft.com/office/drawing/2014/main" id="{C81853FD-E6B6-38E1-FE11-49A3DDA92353}"/>
               </a:ext>
             </a:extLst>
           </p:cNvPr>
@@ -4094,8 +4245,8 @@
         </p:blipFill>
         <p:spPr>
           <a:xfrm>
-            <a:off x="4863591" y="1684751"/>
-            <a:ext cx="2464818" cy="2054014"/>
+            <a:off x="4378695" y="1929290"/>
+            <a:ext cx="3434609" cy="2852131"/>
           </a:xfrm>
           <a:prstGeom prst="rect">
             <a:avLst/>

</xml_diff>

<commit_message>
Fix #93  Add GUIDE to list of core tools
</commit_message>
<xml_diff>
--- a/docs/source/core_tools/figures/framed_core_tool_logos.pptx
+++ b/docs/source/core_tools/figures/framed_core_tool_logos.pptx
@@ -16,7 +16,8 @@
     <p:sldId id="266" r:id="rId10"/>
     <p:sldId id="267" r:id="rId11"/>
     <p:sldId id="268" r:id="rId12"/>
-    <p:sldId id="258" r:id="rId13"/>
+    <p:sldId id="269" r:id="rId13"/>
+    <p:sldId id="258" r:id="rId14"/>
   </p:sldIdLst>
   <p:sldSz cx="12192000" cy="6858000"/>
   <p:notesSz cx="6858000" cy="9144000"/>
@@ -281,7 +282,7 @@
           <a:p>
             <a:fld id="{9777CE0B-FDD2-AE4F-949E-C253776A1713}" type="datetimeFigureOut">
               <a:rPr lang="en-US" smtClean="0"/>
-              <a:t>2/18/23</a:t>
+              <a:t>7/18/23</a:t>
             </a:fld>
             <a:endParaRPr lang="en-US"/>
           </a:p>
@@ -479,7 +480,7 @@
           <a:p>
             <a:fld id="{9777CE0B-FDD2-AE4F-949E-C253776A1713}" type="datetimeFigureOut">
               <a:rPr lang="en-US" smtClean="0"/>
-              <a:t>2/18/23</a:t>
+              <a:t>7/18/23</a:t>
             </a:fld>
             <a:endParaRPr lang="en-US"/>
           </a:p>
@@ -687,7 +688,7 @@
           <a:p>
             <a:fld id="{9777CE0B-FDD2-AE4F-949E-C253776A1713}" type="datetimeFigureOut">
               <a:rPr lang="en-US" smtClean="0"/>
-              <a:t>2/18/23</a:t>
+              <a:t>7/18/23</a:t>
             </a:fld>
             <a:endParaRPr lang="en-US"/>
           </a:p>
@@ -885,7 +886,7 @@
           <a:p>
             <a:fld id="{9777CE0B-FDD2-AE4F-949E-C253776A1713}" type="datetimeFigureOut">
               <a:rPr lang="en-US" smtClean="0"/>
-              <a:t>2/18/23</a:t>
+              <a:t>7/18/23</a:t>
             </a:fld>
             <a:endParaRPr lang="en-US"/>
           </a:p>
@@ -1160,7 +1161,7 @@
           <a:p>
             <a:fld id="{9777CE0B-FDD2-AE4F-949E-C253776A1713}" type="datetimeFigureOut">
               <a:rPr lang="en-US" smtClean="0"/>
-              <a:t>2/18/23</a:t>
+              <a:t>7/18/23</a:t>
             </a:fld>
             <a:endParaRPr lang="en-US"/>
           </a:p>
@@ -1425,7 +1426,7 @@
           <a:p>
             <a:fld id="{9777CE0B-FDD2-AE4F-949E-C253776A1713}" type="datetimeFigureOut">
               <a:rPr lang="en-US" smtClean="0"/>
-              <a:t>2/18/23</a:t>
+              <a:t>7/18/23</a:t>
             </a:fld>
             <a:endParaRPr lang="en-US"/>
           </a:p>
@@ -1837,7 +1838,7 @@
           <a:p>
             <a:fld id="{9777CE0B-FDD2-AE4F-949E-C253776A1713}" type="datetimeFigureOut">
               <a:rPr lang="en-US" smtClean="0"/>
-              <a:t>2/18/23</a:t>
+              <a:t>7/18/23</a:t>
             </a:fld>
             <a:endParaRPr lang="en-US"/>
           </a:p>
@@ -1978,7 +1979,7 @@
           <a:p>
             <a:fld id="{9777CE0B-FDD2-AE4F-949E-C253776A1713}" type="datetimeFigureOut">
               <a:rPr lang="en-US" smtClean="0"/>
-              <a:t>2/18/23</a:t>
+              <a:t>7/18/23</a:t>
             </a:fld>
             <a:endParaRPr lang="en-US"/>
           </a:p>
@@ -2091,7 +2092,7 @@
           <a:p>
             <a:fld id="{9777CE0B-FDD2-AE4F-949E-C253776A1713}" type="datetimeFigureOut">
               <a:rPr lang="en-US" smtClean="0"/>
-              <a:t>2/18/23</a:t>
+              <a:t>7/18/23</a:t>
             </a:fld>
             <a:endParaRPr lang="en-US"/>
           </a:p>
@@ -2402,7 +2403,7 @@
           <a:p>
             <a:fld id="{9777CE0B-FDD2-AE4F-949E-C253776A1713}" type="datetimeFigureOut">
               <a:rPr lang="en-US" smtClean="0"/>
-              <a:t>2/18/23</a:t>
+              <a:t>7/18/23</a:t>
             </a:fld>
             <a:endParaRPr lang="en-US"/>
           </a:p>
@@ -2690,7 +2691,7 @@
           <a:p>
             <a:fld id="{9777CE0B-FDD2-AE4F-949E-C253776A1713}" type="datetimeFigureOut">
               <a:rPr lang="en-US" smtClean="0"/>
-              <a:t>2/18/23</a:t>
+              <a:t>7/18/23</a:t>
             </a:fld>
             <a:endParaRPr lang="en-US"/>
           </a:p>
@@ -2931,7 +2932,7 @@
           <a:p>
             <a:fld id="{9777CE0B-FDD2-AE4F-949E-C253776A1713}" type="datetimeFigureOut">
               <a:rPr lang="en-US" smtClean="0"/>
-              <a:t>2/18/23</a:t>
+              <a:t>7/18/23</a:t>
             </a:fld>
             <a:endParaRPr lang="en-US"/>
           </a:p>
@@ -3988,6 +3989,139 @@
           <a:xfrm>
             <a:off x="4294462" y="1942727"/>
             <a:ext cx="3630338" cy="2633564"/>
+          </a:xfrm>
+          <a:prstGeom prst="rect">
+            <a:avLst/>
+          </a:prstGeom>
+          <a:noFill/>
+          <a:extLst>
+            <a:ext uri="{909E8E84-426E-40DD-AFC4-6F175D3DCCD1}">
+              <a14:hiddenFill xmlns:a14="http://schemas.microsoft.com/office/drawing/2010/main">
+                <a:solidFill>
+                  <a:srgbClr val="FFFFFF"/>
+                </a:solidFill>
+              </a14:hiddenFill>
+            </a:ext>
+          </a:extLst>
+        </p:spPr>
+      </p:pic>
+    </p:spTree>
+    <p:extLst>
+      <p:ext uri="{BB962C8B-B14F-4D97-AF65-F5344CB8AC3E}">
+        <p14:creationId xmlns:p14="http://schemas.microsoft.com/office/powerpoint/2010/main" val="2906899187"/>
+      </p:ext>
+    </p:extLst>
+  </p:cSld>
+  <p:clrMapOvr>
+    <a:masterClrMapping/>
+  </p:clrMapOvr>
+</p:sld>
+</file>
+
+<file path=ppt/slides/slide13.xml><?xml version="1.0" encoding="utf-8"?>
+<p:sld xmlns:a="http://schemas.openxmlformats.org/drawingml/2006/main" xmlns:r="http://schemas.openxmlformats.org/officeDocument/2006/relationships" xmlns:p="http://schemas.openxmlformats.org/presentationml/2006/main">
+  <p:cSld>
+    <p:spTree>
+      <p:nvGrpSpPr>
+        <p:cNvPr id="1" name=""/>
+        <p:cNvGrpSpPr/>
+        <p:nvPr/>
+      </p:nvGrpSpPr>
+      <p:grpSpPr>
+        <a:xfrm>
+          <a:off x="0" y="0"/>
+          <a:ext cx="0" cy="0"/>
+          <a:chOff x="0" y="0"/>
+          <a:chExt cx="0" cy="0"/>
+        </a:xfrm>
+      </p:grpSpPr>
+      <p:sp>
+        <p:nvSpPr>
+          <p:cNvPr id="4" name="Rounded Rectangle 3">
+            <a:extLst>
+              <a:ext uri="{FF2B5EF4-FFF2-40B4-BE49-F238E27FC236}">
+                <a16:creationId xmlns:a16="http://schemas.microsoft.com/office/drawing/2014/main" id="{B13C41E7-B9ED-9143-B398-30AD0586E601}"/>
+              </a:ext>
+            </a:extLst>
+          </p:cNvPr>
+          <p:cNvSpPr>
+            <a:spLocks noChangeAspect="1"/>
+          </p:cNvSpPr>
+          <p:nvPr/>
+        </p:nvSpPr>
+        <p:spPr>
+          <a:xfrm>
+            <a:off x="4267200" y="1521913"/>
+            <a:ext cx="3657600" cy="3657600"/>
+          </a:xfrm>
+          <a:prstGeom prst="roundRect">
+            <a:avLst/>
+          </a:prstGeom>
+          <a:solidFill>
+            <a:schemeClr val="bg1"/>
+          </a:solidFill>
+          <a:ln w="38100">
+            <a:solidFill>
+              <a:srgbClr val="0F4C7C"/>
+            </a:solidFill>
+          </a:ln>
+        </p:spPr>
+        <p:style>
+          <a:lnRef idx="2">
+            <a:schemeClr val="accent1">
+              <a:shade val="50000"/>
+            </a:schemeClr>
+          </a:lnRef>
+          <a:fillRef idx="1">
+            <a:schemeClr val="accent1"/>
+          </a:fillRef>
+          <a:effectRef idx="0">
+            <a:schemeClr val="accent1"/>
+          </a:effectRef>
+          <a:fontRef idx="minor">
+            <a:schemeClr val="lt1"/>
+          </a:fontRef>
+        </p:style>
+        <p:txBody>
+          <a:bodyPr rtlCol="0" anchor="ctr"/>
+          <a:lstStyle/>
+          <a:p>
+            <a:pPr algn="ctr"/>
+            <a:endParaRPr lang="en-US"/>
+          </a:p>
+        </p:txBody>
+      </p:sp>
+      <p:pic>
+        <p:nvPicPr>
+          <p:cNvPr id="1026" name="Picture 2" descr="NeuroConv logo">
+            <a:extLst>
+              <a:ext uri="{FF2B5EF4-FFF2-40B4-BE49-F238E27FC236}">
+                <a16:creationId xmlns:a16="http://schemas.microsoft.com/office/drawing/2014/main" id="{F5AA7A2D-B96B-35B5-86F6-9DA0B0C7E445}"/>
+              </a:ext>
+            </a:extLst>
+          </p:cNvPr>
+          <p:cNvPicPr>
+            <a:picLocks noChangeAspect="1" noChangeArrowheads="1"/>
+          </p:cNvPicPr>
+          <p:nvPr/>
+        </p:nvPicPr>
+        <p:blipFill>
+          <a:blip r:embed="rId2">
+            <a:extLst>
+              <a:ext uri="{28A0092B-C50C-407E-A947-70E740481C1C}">
+                <a14:useLocalDpi xmlns:a14="http://schemas.microsoft.com/office/drawing/2010/main" val="0"/>
+              </a:ext>
+            </a:extLst>
+          </a:blip>
+          <a:srcRect/>
+          <a:stretch>
+            <a:fillRect/>
+          </a:stretch>
+        </p:blipFill>
+        <p:spPr bwMode="auto">
+          <a:xfrm>
+            <a:off x="4394200" y="1810369"/>
+            <a:ext cx="3386094" cy="2708875"/>
           </a:xfrm>
           <a:prstGeom prst="rect">
             <a:avLst/>

</xml_diff>

<commit_message>
Fix #94 Add schema language to the list of core tools
</commit_message>
<xml_diff>
--- a/docs/source/core_tools/figures/framed_core_tool_logos.pptx
+++ b/docs/source/core_tools/figures/framed_core_tool_logos.pptx
@@ -14,10 +14,11 @@
     <p:sldId id="263" r:id="rId8"/>
     <p:sldId id="265" r:id="rId9"/>
     <p:sldId id="266" r:id="rId10"/>
-    <p:sldId id="267" r:id="rId11"/>
-    <p:sldId id="268" r:id="rId12"/>
-    <p:sldId id="269" r:id="rId13"/>
-    <p:sldId id="258" r:id="rId14"/>
+    <p:sldId id="270" r:id="rId11"/>
+    <p:sldId id="267" r:id="rId12"/>
+    <p:sldId id="268" r:id="rId13"/>
+    <p:sldId id="269" r:id="rId14"/>
+    <p:sldId id="258" r:id="rId15"/>
   </p:sldIdLst>
   <p:sldSz cx="12192000" cy="6858000"/>
   <p:notesSz cx="6858000" cy="9144000"/>
@@ -3482,6 +3483,274 @@
           <a:chExt cx="0" cy="0"/>
         </a:xfrm>
       </p:grpSpPr>
+      <p:grpSp>
+        <p:nvGrpSpPr>
+          <p:cNvPr id="11" name="Group 10">
+            <a:extLst>
+              <a:ext uri="{FF2B5EF4-FFF2-40B4-BE49-F238E27FC236}">
+                <a16:creationId xmlns:a16="http://schemas.microsoft.com/office/drawing/2014/main" id="{F2FD4BC1-C862-4F86-1395-EC82EA38CF76}"/>
+              </a:ext>
+            </a:extLst>
+          </p:cNvPr>
+          <p:cNvGrpSpPr/>
+          <p:nvPr/>
+        </p:nvGrpSpPr>
+        <p:grpSpPr>
+          <a:xfrm>
+            <a:off x="4267200" y="1521913"/>
+            <a:ext cx="3657601" cy="3657600"/>
+            <a:chOff x="4267200" y="1521913"/>
+            <a:chExt cx="3657601" cy="3657600"/>
+          </a:xfrm>
+        </p:grpSpPr>
+        <p:sp>
+          <p:nvSpPr>
+            <p:cNvPr id="12" name="Rounded Rectangle 11">
+              <a:extLst>
+                <a:ext uri="{FF2B5EF4-FFF2-40B4-BE49-F238E27FC236}">
+                  <a16:creationId xmlns:a16="http://schemas.microsoft.com/office/drawing/2014/main" id="{03CF8329-FF61-F581-2474-B38C75EE253A}"/>
+                </a:ext>
+              </a:extLst>
+            </p:cNvPr>
+            <p:cNvSpPr>
+              <a:spLocks noChangeAspect="1"/>
+            </p:cNvSpPr>
+            <p:nvPr/>
+          </p:nvSpPr>
+          <p:spPr>
+            <a:xfrm>
+              <a:off x="4267200" y="1521913"/>
+              <a:ext cx="3657600" cy="3657600"/>
+            </a:xfrm>
+            <a:prstGeom prst="roundRect">
+              <a:avLst/>
+            </a:prstGeom>
+            <a:solidFill>
+              <a:schemeClr val="bg1"/>
+            </a:solidFill>
+            <a:ln w="38100">
+              <a:solidFill>
+                <a:srgbClr val="0F4C7C"/>
+              </a:solidFill>
+            </a:ln>
+          </p:spPr>
+          <p:style>
+            <a:lnRef idx="2">
+              <a:schemeClr val="accent1">
+                <a:shade val="50000"/>
+              </a:schemeClr>
+            </a:lnRef>
+            <a:fillRef idx="1">
+              <a:schemeClr val="accent1"/>
+            </a:fillRef>
+            <a:effectRef idx="0">
+              <a:schemeClr val="accent1"/>
+            </a:effectRef>
+            <a:fontRef idx="minor">
+              <a:schemeClr val="lt1"/>
+            </a:fontRef>
+          </p:style>
+          <p:txBody>
+            <a:bodyPr rtlCol="0" anchor="ctr"/>
+            <a:lstStyle/>
+            <a:p>
+              <a:pPr algn="ctr"/>
+              <a:endParaRPr lang="en-US"/>
+            </a:p>
+          </p:txBody>
+        </p:sp>
+        <p:sp>
+          <p:nvSpPr>
+            <p:cNvPr id="13" name="TextBox 12">
+              <a:extLst>
+                <a:ext uri="{FF2B5EF4-FFF2-40B4-BE49-F238E27FC236}">
+                  <a16:creationId xmlns:a16="http://schemas.microsoft.com/office/drawing/2014/main" id="{59342A99-F92B-FF40-17DF-EEF8876051CB}"/>
+                </a:ext>
+              </a:extLst>
+            </p:cNvPr>
+            <p:cNvSpPr txBox="1"/>
+            <p:nvPr/>
+          </p:nvSpPr>
+          <p:spPr>
+            <a:xfrm>
+              <a:off x="4267200" y="3803337"/>
+              <a:ext cx="3657601" cy="1182022"/>
+            </a:xfrm>
+            <a:prstGeom prst="rect">
+              <a:avLst/>
+            </a:prstGeom>
+            <a:noFill/>
+            <a:effectLst/>
+          </p:spPr>
+          <p:txBody>
+            <a:bodyPr wrap="square" lIns="0" tIns="0" rIns="0" bIns="0" rtlCol="0">
+              <a:noAutofit/>
+            </a:bodyPr>
+            <a:lstStyle/>
+            <a:p>
+              <a:pPr algn="ctr"/>
+              <a:r>
+                <a:rPr lang="en-US" sz="4000" dirty="0">
+                  <a:solidFill>
+                    <a:srgbClr val="0F4C7D"/>
+                  </a:solidFill>
+                  <a:ea typeface="Brush Script MT" panose="03060802040406070304" pitchFamily="66" charset="-122"/>
+                  <a:cs typeface="Arial" panose="020B0604020202020204" pitchFamily="34" charset="0"/>
+                </a:rPr>
+                <a:t>Specification Language</a:t>
+              </a:r>
+            </a:p>
+          </p:txBody>
+        </p:sp>
+        <p:pic>
+          <p:nvPicPr>
+            <p:cNvPr id="14" name="Picture 13">
+              <a:extLst>
+                <a:ext uri="{FF2B5EF4-FFF2-40B4-BE49-F238E27FC236}">
+                  <a16:creationId xmlns:a16="http://schemas.microsoft.com/office/drawing/2014/main" id="{1EFBF573-BEF5-BB76-F1AE-2066DC1E1253}"/>
+                </a:ext>
+              </a:extLst>
+            </p:cNvPr>
+            <p:cNvPicPr>
+              <a:picLocks noChangeAspect="1"/>
+            </p:cNvPicPr>
+            <p:nvPr/>
+          </p:nvPicPr>
+          <p:blipFill>
+            <a:blip r:embed="rId2"/>
+            <a:stretch>
+              <a:fillRect/>
+            </a:stretch>
+          </p:blipFill>
+          <p:spPr>
+            <a:xfrm>
+              <a:off x="4459077" y="1863961"/>
+              <a:ext cx="1428843" cy="1190702"/>
+            </a:xfrm>
+            <a:prstGeom prst="rect">
+              <a:avLst/>
+            </a:prstGeom>
+          </p:spPr>
+        </p:pic>
+        <p:pic>
+          <p:nvPicPr>
+            <p:cNvPr id="15" name="Picture 4">
+              <a:extLst>
+                <a:ext uri="{FF2B5EF4-FFF2-40B4-BE49-F238E27FC236}">
+                  <a16:creationId xmlns:a16="http://schemas.microsoft.com/office/drawing/2014/main" id="{FDF8B180-6722-623D-4F21-A47553D5D0A1}"/>
+                </a:ext>
+              </a:extLst>
+            </p:cNvPr>
+            <p:cNvPicPr>
+              <a:picLocks noChangeAspect="1" noChangeArrowheads="1"/>
+            </p:cNvPicPr>
+            <p:nvPr/>
+          </p:nvPicPr>
+          <p:blipFill rotWithShape="1">
+            <a:blip r:embed="rId3">
+              <a:extLst>
+                <a:ext uri="{28A0092B-C50C-407E-A947-70E740481C1C}">
+                  <a14:useLocalDpi xmlns:a14="http://schemas.microsoft.com/office/drawing/2010/main" val="0"/>
+                </a:ext>
+              </a:extLst>
+            </a:blip>
+            <a:srcRect b="17918"/>
+            <a:stretch/>
+          </p:blipFill>
+          <p:spPr bwMode="auto">
+            <a:xfrm>
+              <a:off x="5991275" y="2219658"/>
+              <a:ext cx="1885848" cy="1368055"/>
+            </a:xfrm>
+            <a:prstGeom prst="rect">
+              <a:avLst/>
+            </a:prstGeom>
+            <a:noFill/>
+            <a:extLst>
+              <a:ext uri="{909E8E84-426E-40DD-AFC4-6F175D3DCCD1}">
+                <a14:hiddenFill xmlns:a14="http://schemas.microsoft.com/office/drawing/2010/main">
+                  <a:solidFill>
+                    <a:srgbClr val="FFFFFF"/>
+                  </a:solidFill>
+                </a14:hiddenFill>
+              </a:ext>
+            </a:extLst>
+          </p:spPr>
+        </p:pic>
+        <p:cxnSp>
+          <p:nvCxnSpPr>
+            <p:cNvPr id="16" name="Straight Connector 15">
+              <a:extLst>
+                <a:ext uri="{FF2B5EF4-FFF2-40B4-BE49-F238E27FC236}">
+                  <a16:creationId xmlns:a16="http://schemas.microsoft.com/office/drawing/2014/main" id="{43EECCE4-B8F0-26D0-F377-392C3D4F8C37}"/>
+                </a:ext>
+              </a:extLst>
+            </p:cNvPr>
+            <p:cNvCxnSpPr>
+              <a:cxnSpLocks/>
+            </p:cNvCxnSpPr>
+            <p:nvPr/>
+          </p:nvCxnSpPr>
+          <p:spPr>
+            <a:xfrm flipV="1">
+              <a:off x="5451231" y="1957775"/>
+              <a:ext cx="1151110" cy="1603562"/>
+            </a:xfrm>
+            <a:prstGeom prst="line">
+              <a:avLst/>
+            </a:prstGeom>
+            <a:ln w="38100">
+              <a:solidFill>
+                <a:srgbClr val="0F4C7C"/>
+              </a:solidFill>
+            </a:ln>
+          </p:spPr>
+          <p:style>
+            <a:lnRef idx="1">
+              <a:schemeClr val="accent1"/>
+            </a:lnRef>
+            <a:fillRef idx="0">
+              <a:schemeClr val="accent1"/>
+            </a:fillRef>
+            <a:effectRef idx="0">
+              <a:schemeClr val="accent1"/>
+            </a:effectRef>
+            <a:fontRef idx="minor">
+              <a:schemeClr val="tx1"/>
+            </a:fontRef>
+          </p:style>
+        </p:cxnSp>
+      </p:grpSp>
+    </p:spTree>
+    <p:extLst>
+      <p:ext uri="{BB962C8B-B14F-4D97-AF65-F5344CB8AC3E}">
+        <p14:creationId xmlns:p14="http://schemas.microsoft.com/office/powerpoint/2010/main" val="1453619907"/>
+      </p:ext>
+    </p:extLst>
+  </p:cSld>
+  <p:clrMapOvr>
+    <a:masterClrMapping/>
+  </p:clrMapOvr>
+</p:sld>
+</file>
+
+<file path=ppt/slides/slide11.xml><?xml version="1.0" encoding="utf-8"?>
+<p:sld xmlns:a="http://schemas.openxmlformats.org/drawingml/2006/main" xmlns:r="http://schemas.openxmlformats.org/officeDocument/2006/relationships" xmlns:p="http://schemas.openxmlformats.org/presentationml/2006/main">
+  <p:cSld>
+    <p:spTree>
+      <p:nvGrpSpPr>
+        <p:cNvPr id="1" name=""/>
+        <p:cNvGrpSpPr/>
+        <p:nvPr/>
+      </p:nvGrpSpPr>
+      <p:grpSpPr>
+        <a:xfrm>
+          <a:off x="0" y="0"/>
+          <a:ext cx="0" cy="0"/>
+          <a:chOff x="0" y="0"/>
+          <a:chExt cx="0" cy="0"/>
+        </a:xfrm>
+      </p:grpSpPr>
       <p:sp>
         <p:nvSpPr>
           <p:cNvPr id="4" name="Rounded Rectangle 3">
@@ -3694,7 +3963,7 @@
 </p:sld>
 </file>
 
-<file path=ppt/slides/slide11.xml><?xml version="1.0" encoding="utf-8"?>
+<file path=ppt/slides/slide12.xml><?xml version="1.0" encoding="utf-8"?>
 <p:sld xmlns:a="http://schemas.openxmlformats.org/drawingml/2006/main" xmlns:r="http://schemas.openxmlformats.org/officeDocument/2006/relationships" xmlns:p="http://schemas.openxmlformats.org/presentationml/2006/main">
   <p:cSld>
     <p:spTree>
@@ -3887,7 +4156,7 @@
 </p:sld>
 </file>
 
-<file path=ppt/slides/slide12.xml><?xml version="1.0" encoding="utf-8"?>
+<file path=ppt/slides/slide13.xml><?xml version="1.0" encoding="utf-8"?>
 <p:sld xmlns:a="http://schemas.openxmlformats.org/drawingml/2006/main" xmlns:r="http://schemas.openxmlformats.org/officeDocument/2006/relationships" xmlns:p="http://schemas.openxmlformats.org/presentationml/2006/main">
   <p:cSld>
     <p:spTree>
@@ -4018,7 +4287,7 @@
 </p:sld>
 </file>
 
-<file path=ppt/slides/slide13.xml><?xml version="1.0" encoding="utf-8"?>
+<file path=ppt/slides/slide14.xml><?xml version="1.0" encoding="utf-8"?>
 <p:sld xmlns:a="http://schemas.openxmlformats.org/drawingml/2006/main" xmlns:r="http://schemas.openxmlformats.org/officeDocument/2006/relationships" xmlns:p="http://schemas.openxmlformats.org/presentationml/2006/main">
   <p:cSld>
     <p:spTree>

</xml_diff>